<commit_message>
updated poster and added KNN classifier
</commit_message>
<xml_diff>
--- a/Project/project_poster.pptx
+++ b/Project/project_poster.pptx
@@ -303,7 +303,7 @@
             <a:fld id="{C33D5922-1A10-453D-B34B-87D0376FB0F9}" type="datetimeFigureOut">
               <a:rPr lang="en-US" smtClean="0"/>
               <a:pPr/>
-              <a:t>11-Mar-19</a:t>
+              <a:t>3/11/2019</a:t>
             </a:fld>
             <a:endParaRPr lang="en-US"/>
           </a:p>
@@ -468,7 +468,7 @@
             <a:fld id="{C33D5922-1A10-453D-B34B-87D0376FB0F9}" type="datetimeFigureOut">
               <a:rPr lang="en-US" smtClean="0"/>
               <a:pPr/>
-              <a:t>11-Mar-19</a:t>
+              <a:t>3/11/2019</a:t>
             </a:fld>
             <a:endParaRPr lang="en-US"/>
           </a:p>
@@ -643,7 +643,7 @@
             <a:fld id="{C33D5922-1A10-453D-B34B-87D0376FB0F9}" type="datetimeFigureOut">
               <a:rPr lang="en-US" smtClean="0"/>
               <a:pPr/>
-              <a:t>11-Mar-19</a:t>
+              <a:t>3/11/2019</a:t>
             </a:fld>
             <a:endParaRPr lang="en-US"/>
           </a:p>
@@ -808,7 +808,7 @@
             <a:fld id="{C33D5922-1A10-453D-B34B-87D0376FB0F9}" type="datetimeFigureOut">
               <a:rPr lang="en-US" smtClean="0"/>
               <a:pPr/>
-              <a:t>11-Mar-19</a:t>
+              <a:t>3/11/2019</a:t>
             </a:fld>
             <a:endParaRPr lang="en-US"/>
           </a:p>
@@ -1050,7 +1050,7 @@
             <a:fld id="{C33D5922-1A10-453D-B34B-87D0376FB0F9}" type="datetimeFigureOut">
               <a:rPr lang="en-US" smtClean="0"/>
               <a:pPr/>
-              <a:t>11-Mar-19</a:t>
+              <a:t>3/11/2019</a:t>
             </a:fld>
             <a:endParaRPr lang="en-US"/>
           </a:p>
@@ -1332,7 +1332,7 @@
             <a:fld id="{C33D5922-1A10-453D-B34B-87D0376FB0F9}" type="datetimeFigureOut">
               <a:rPr lang="en-US" smtClean="0"/>
               <a:pPr/>
-              <a:t>11-Mar-19</a:t>
+              <a:t>3/11/2019</a:t>
             </a:fld>
             <a:endParaRPr lang="en-US"/>
           </a:p>
@@ -1753,7 +1753,7 @@
             <a:fld id="{C33D5922-1A10-453D-B34B-87D0376FB0F9}" type="datetimeFigureOut">
               <a:rPr lang="en-US" smtClean="0"/>
               <a:pPr/>
-              <a:t>11-Mar-19</a:t>
+              <a:t>3/11/2019</a:t>
             </a:fld>
             <a:endParaRPr lang="en-US"/>
           </a:p>
@@ -1867,7 +1867,7 @@
             <a:fld id="{C33D5922-1A10-453D-B34B-87D0376FB0F9}" type="datetimeFigureOut">
               <a:rPr lang="en-US" smtClean="0"/>
               <a:pPr/>
-              <a:t>11-Mar-19</a:t>
+              <a:t>3/11/2019</a:t>
             </a:fld>
             <a:endParaRPr lang="en-US"/>
           </a:p>
@@ -1959,7 +1959,7 @@
             <a:fld id="{C33D5922-1A10-453D-B34B-87D0376FB0F9}" type="datetimeFigureOut">
               <a:rPr lang="en-US" smtClean="0"/>
               <a:pPr/>
-              <a:t>11-Mar-19</a:t>
+              <a:t>3/11/2019</a:t>
             </a:fld>
             <a:endParaRPr lang="en-US"/>
           </a:p>
@@ -2231,7 +2231,7 @@
             <a:fld id="{C33D5922-1A10-453D-B34B-87D0376FB0F9}" type="datetimeFigureOut">
               <a:rPr lang="en-US" smtClean="0"/>
               <a:pPr/>
-              <a:t>11-Mar-19</a:t>
+              <a:t>3/11/2019</a:t>
             </a:fld>
             <a:endParaRPr lang="en-US"/>
           </a:p>
@@ -2480,7 +2480,7 @@
             <a:fld id="{C33D5922-1A10-453D-B34B-87D0376FB0F9}" type="datetimeFigureOut">
               <a:rPr lang="en-US" smtClean="0"/>
               <a:pPr/>
-              <a:t>11-Mar-19</a:t>
+              <a:t>3/11/2019</a:t>
             </a:fld>
             <a:endParaRPr lang="en-US"/>
           </a:p>
@@ -2688,7 +2688,7 @@
             <a:fld id="{C33D5922-1A10-453D-B34B-87D0376FB0F9}" type="datetimeFigureOut">
               <a:rPr lang="en-US" smtClean="0"/>
               <a:pPr/>
-              <a:t>11-Mar-19</a:t>
+              <a:t>3/11/2019</a:t>
             </a:fld>
             <a:endParaRPr lang="en-US"/>
           </a:p>
@@ -4270,7 +4270,7 @@
         <p:spPr>
           <a:xfrm>
             <a:off x="792313" y="15698044"/>
-            <a:ext cx="15409712" cy="4278094"/>
+            <a:ext cx="15409712" cy="3539430"/>
           </a:xfrm>
           <a:prstGeom prst="rect">
             <a:avLst/>
@@ -4288,7 +4288,7 @@
               <a:buChar char="•"/>
             </a:pPr>
             <a:r>
-              <a:rPr lang="en-US" sz="3400" dirty="0"/>
+              <a:rPr lang="en-US" sz="3200" dirty="0"/>
               <a:t>Compare between different methods of supervised and unsupervised approaches of classifying gene expression.</a:t>
             </a:r>
           </a:p>
@@ -4298,7 +4298,7 @@
               <a:buChar char="•"/>
             </a:pPr>
             <a:r>
-              <a:rPr lang="en-US" sz="3400" dirty="0"/>
+              <a:rPr lang="en-US" sz="3200" dirty="0"/>
               <a:t>Be able to classify whether a gene is related to apoptosis based on its expression levels in different cells, with and without treatment. We expect genes associated with apoptosis show difference in expression levels between treatment and control samples.</a:t>
             </a:r>
           </a:p>
@@ -4308,7 +4308,7 @@
               <a:buChar char="•"/>
             </a:pPr>
             <a:r>
-              <a:rPr lang="en-US" sz="3400" dirty="0"/>
+              <a:rPr lang="en-US" sz="3200" dirty="0"/>
               <a:t>In order to train the classifier we’ll use a dataset with genes as the rows (“samples”) and cell-line samples as the features. The output will be TRUE or FALSE.</a:t>
             </a:r>
           </a:p>
@@ -4331,7 +4331,7 @@
             <p:spPr>
               <a:xfrm>
                 <a:off x="1080345" y="20882620"/>
-                <a:ext cx="15193688" cy="22351696"/>
+                <a:ext cx="15193688" cy="21534806"/>
               </a:xfrm>
               <a:prstGeom prst="rect">
                 <a:avLst/>
@@ -4349,11 +4349,11 @@
                   <a:buChar char="•"/>
                 </a:pPr>
                 <a:r>
-                  <a:rPr lang="en-US" sz="3400" b="1" u="sng" dirty="0"/>
+                  <a:rPr lang="en-US" sz="3200" b="1" u="sng" dirty="0"/>
                   <a:t>GEO</a:t>
                 </a:r>
                 <a:r>
-                  <a:rPr lang="en-US" sz="3400" dirty="0"/>
+                  <a:rPr lang="en-US" sz="3200" dirty="0"/>
                   <a:t> – public genomics data repository</a:t>
                 </a:r>
               </a:p>
@@ -4363,11 +4363,11 @@
                   <a:buChar char="•"/>
                 </a:pPr>
                 <a:r>
-                  <a:rPr lang="en-US" sz="3400" b="1" u="sng" dirty="0" err="1"/>
+                  <a:rPr lang="en-US" sz="3200" b="1" u="sng" dirty="0" err="1"/>
                   <a:t>AmiGo</a:t>
                 </a:r>
                 <a:r>
-                  <a:rPr lang="en-US" sz="3400" dirty="0"/>
+                  <a:rPr lang="en-US" sz="3200" dirty="0"/>
                   <a:t> – Web-based set of tools for searching and browsing the gene ontology. database. We used it to obtain a list of GO terms associated with apoptosis.</a:t>
                 </a:r>
               </a:p>
@@ -4377,25 +4377,25 @@
                   <a:buChar char="•"/>
                 </a:pPr>
                 <a:r>
-                  <a:rPr lang="en-US" sz="3400" b="1" u="sng" dirty="0" err="1"/>
+                  <a:rPr lang="en-US" sz="3200" b="1" u="sng" dirty="0" err="1"/>
                   <a:t>Scikit</a:t>
                 </a:r>
                 <a:r>
-                  <a:rPr lang="en-US" sz="3400" b="1" u="sng" dirty="0"/>
+                  <a:rPr lang="en-US" sz="3200" b="1" u="sng" dirty="0"/>
                   <a:t>-learn</a:t>
                 </a:r>
                 <a:r>
-                  <a:rPr lang="en-US" sz="3400" dirty="0"/>
+                  <a:rPr lang="en-US" sz="3200" dirty="0"/>
                   <a:t> – Python library for machine learning.</a:t>
                 </a:r>
-                <a:endParaRPr lang="en-US" sz="3400" b="1" u="sng" dirty="0"/>
+                <a:endParaRPr lang="en-US" sz="3200" b="1" u="sng" dirty="0"/>
               </a:p>
               <a:p>
-                <a:endParaRPr lang="en-US" sz="3400" dirty="0"/>
+                <a:endParaRPr lang="en-US" sz="3200" dirty="0"/>
               </a:p>
               <a:p>
                 <a:r>
-                  <a:rPr lang="en-US" sz="3400" dirty="0">
+                  <a:rPr lang="en-US" sz="3200" dirty="0">
                     <a:ln w="0"/>
                     <a:solidFill>
                       <a:schemeClr val="accent4">
@@ -4412,7 +4412,7 @@
                   </a:rPr>
                   <a:t>Building the dataset</a:t>
                 </a:r>
-                <a:endParaRPr lang="en-US" sz="3400" dirty="0"/>
+                <a:endParaRPr lang="en-US" sz="3200" dirty="0"/>
               </a:p>
               <a:p>
                 <a:pPr marL="571500" indent="-571500">
@@ -4420,7 +4420,7 @@
                   <a:buChar char="•"/>
                 </a:pPr>
                 <a:r>
-                  <a:rPr lang="en-US" sz="3400" dirty="0"/>
+                  <a:rPr lang="en-US" sz="3200" dirty="0"/>
                   <a:t>Uniting all probes that belong to the same gene by calculating expression means.</a:t>
                 </a:r>
               </a:p>
@@ -4430,7 +4430,7 @@
                   <a:buChar char="•"/>
                 </a:pPr>
                 <a:r>
-                  <a:rPr lang="en-US" sz="3400" dirty="0"/>
+                  <a:rPr lang="en-US" sz="3200" dirty="0"/>
                   <a:t>Labeling the data using process GO term: label ‘TRUE’ for genes associated with apoptosis GO terms and label ‘FALSE’ otherwise.</a:t>
                 </a:r>
               </a:p>
@@ -4440,16 +4440,16 @@
                   <a:buChar char="•"/>
                 </a:pPr>
                 <a:r>
-                  <a:rPr lang="en-US" sz="3400" dirty="0"/>
+                  <a:rPr lang="en-US" sz="3200" dirty="0"/>
                   <a:t>10.74% of genes are labeled ‘TRUE’ in the initial dataset.</a:t>
                 </a:r>
               </a:p>
               <a:p>
-                <a:endParaRPr lang="en-US" sz="3400" dirty="0"/>
+                <a:endParaRPr lang="en-US" sz="3200" dirty="0"/>
               </a:p>
               <a:p>
                 <a:r>
-                  <a:rPr lang="en-US" sz="3400" dirty="0">
+                  <a:rPr lang="en-US" sz="3200" dirty="0">
                     <a:ln w="0"/>
                     <a:solidFill>
                       <a:schemeClr val="accent4">
@@ -4466,7 +4466,7 @@
                   </a:rPr>
                   <a:t>Scoring methods - classifying</a:t>
                 </a:r>
-                <a:endParaRPr lang="en-US" sz="3400" dirty="0"/>
+                <a:endParaRPr lang="en-US" sz="3200" dirty="0"/>
               </a:p>
               <a:p>
                 <a:pPr marL="571500" indent="-571500">
@@ -4474,7 +4474,7 @@
                   <a:buChar char="•"/>
                 </a:pPr>
                 <a:r>
-                  <a:rPr lang="en-US" sz="3400" dirty="0"/>
+                  <a:rPr lang="en-US" sz="3200" dirty="0"/>
                   <a:t>Accuracy: percent of genes correctly classified.</a:t>
                 </a:r>
               </a:p>
@@ -4484,7 +4484,7 @@
                   <a:buChar char="•"/>
                 </a:pPr>
                 <a:r>
-                  <a:rPr lang="en-US" sz="3400" dirty="0"/>
+                  <a:rPr lang="en-US" sz="3200" dirty="0"/>
                   <a:t>Precision: the fraction of true positives out of all genes classified as ‘true’.</a:t>
                 </a:r>
               </a:p>
@@ -4494,7 +4494,7 @@
                   <a:buChar char="•"/>
                 </a:pPr>
                 <a:r>
-                  <a:rPr lang="en-US" sz="3400" dirty="0"/>
+                  <a:rPr lang="en-US" sz="3200" dirty="0"/>
                   <a:t>Recall: the fraction of true positives out of all genes with actual ‘true’’ label.</a:t>
                 </a:r>
               </a:p>
@@ -4503,11 +4503,11 @@
                   <a:buFont typeface="Arial" panose="020B0604020202020204" pitchFamily="34" charset="0"/>
                   <a:buChar char="•"/>
                 </a:pPr>
-                <a:endParaRPr lang="en-US" sz="3400" dirty="0"/>
+                <a:endParaRPr lang="en-US" sz="3200" dirty="0"/>
               </a:p>
               <a:p>
                 <a:r>
-                  <a:rPr lang="en-US" sz="3400" dirty="0">
+                  <a:rPr lang="en-US" sz="3200" dirty="0">
                     <a:ln w="0"/>
                     <a:solidFill>
                       <a:schemeClr val="accent4">
@@ -4524,7 +4524,7 @@
                   </a:rPr>
                   <a:t>Scoring methods - clustering</a:t>
                 </a:r>
-                <a:endParaRPr lang="en-US" sz="3400" dirty="0"/>
+                <a:endParaRPr lang="en-US" sz="3200" dirty="0"/>
               </a:p>
               <a:p>
                 <a:pPr marL="571500" indent="-571500">
@@ -4532,7 +4532,7 @@
                   <a:buChar char="•"/>
                 </a:pPr>
                 <a:r>
-                  <a:rPr lang="en-US" sz="3400" dirty="0"/>
+                  <a:rPr lang="en-US" sz="3200" dirty="0"/>
                   <a:t>Silhouette score: for each sample, the score is calculated as </a:t>
                 </a:r>
                 <a14:m>
@@ -4540,26 +4540,26 @@
                     <m:f>
                       <m:fPr>
                         <m:ctrlPr>
-                          <a:rPr lang="en-US" sz="3400" i="1" smtClean="0">
+                          <a:rPr lang="en-US" sz="3200" i="1" smtClean="0">
                             <a:latin typeface="Cambria Math" panose="02040503050406030204" pitchFamily="18" charset="0"/>
                           </a:rPr>
                         </m:ctrlPr>
                       </m:fPr>
                       <m:num>
                         <m:r>
-                          <a:rPr lang="en-US" sz="3400" b="0" i="1" smtClean="0">
+                          <a:rPr lang="en-US" sz="3200" b="0" i="1" smtClean="0">
                             <a:latin typeface="Cambria Math" panose="02040503050406030204" pitchFamily="18" charset="0"/>
                           </a:rPr>
                           <m:t>𝑏</m:t>
                         </m:r>
                         <m:r>
-                          <a:rPr lang="en-US" sz="3400" b="0" i="1" smtClean="0">
+                          <a:rPr lang="en-US" sz="3200" b="0" i="1" smtClean="0">
                             <a:latin typeface="Cambria Math" panose="02040503050406030204" pitchFamily="18" charset="0"/>
                           </a:rPr>
                           <m:t>−</m:t>
                         </m:r>
                         <m:r>
-                          <a:rPr lang="en-US" sz="3400" b="0" i="1" smtClean="0">
+                          <a:rPr lang="en-US" sz="3200" b="0" i="1" smtClean="0">
                             <a:latin typeface="Cambria Math" panose="02040503050406030204" pitchFamily="18" charset="0"/>
                           </a:rPr>
                           <m:t>𝑎</m:t>
@@ -4569,7 +4569,7 @@
                         <m:func>
                           <m:funcPr>
                             <m:ctrlPr>
-                              <a:rPr lang="en-US" sz="3400" i="1" smtClean="0">
+                              <a:rPr lang="en-US" sz="3200" i="1" smtClean="0">
                                 <a:latin typeface="Cambria Math" panose="02040503050406030204" pitchFamily="18" charset="0"/>
                               </a:rPr>
                             </m:ctrlPr>
@@ -4579,7 +4579,7 @@
                               <m:rPr>
                                 <m:sty m:val="p"/>
                               </m:rPr>
-                              <a:rPr lang="en-US" sz="3400" b="0" i="0" smtClean="0">
+                              <a:rPr lang="en-US" sz="3200" b="0" i="0" smtClean="0">
                                 <a:latin typeface="Cambria Math" panose="02040503050406030204" pitchFamily="18" charset="0"/>
                               </a:rPr>
                               <m:t>max</m:t>
@@ -4589,26 +4589,26 @@
                             <m:d>
                               <m:dPr>
                                 <m:ctrlPr>
-                                  <a:rPr lang="en-US" sz="3400" i="1" smtClean="0">
+                                  <a:rPr lang="en-US" sz="3200" i="1" smtClean="0">
                                     <a:latin typeface="Cambria Math" panose="02040503050406030204" pitchFamily="18" charset="0"/>
                                   </a:rPr>
                                 </m:ctrlPr>
                               </m:dPr>
                               <m:e>
                                 <m:r>
-                                  <a:rPr lang="en-US" sz="3400" b="0" i="1" smtClean="0">
+                                  <a:rPr lang="en-US" sz="3200" b="0" i="1" smtClean="0">
                                     <a:latin typeface="Cambria Math" panose="02040503050406030204" pitchFamily="18" charset="0"/>
                                   </a:rPr>
                                   <m:t>𝑎</m:t>
                                 </m:r>
                                 <m:r>
-                                  <a:rPr lang="en-US" sz="3400" b="0" i="1" smtClean="0">
+                                  <a:rPr lang="en-US" sz="3200" b="0" i="1" smtClean="0">
                                     <a:latin typeface="Cambria Math" panose="02040503050406030204" pitchFamily="18" charset="0"/>
                                   </a:rPr>
                                   <m:t>, </m:t>
                                 </m:r>
                                 <m:r>
-                                  <a:rPr lang="en-US" sz="3400" b="0" i="1" smtClean="0">
+                                  <a:rPr lang="en-US" sz="3200" b="0" i="1" smtClean="0">
                                     <a:latin typeface="Cambria Math" panose="02040503050406030204" pitchFamily="18" charset="0"/>
                                   </a:rPr>
                                   <m:t>𝑏</m:t>
@@ -4622,8 +4622,8 @@
                   </m:oMath>
                 </a14:m>
                 <a:r>
-                  <a:rPr lang="en-US" sz="3400" dirty="0"/>
-                  <a:t>, where (a) is the mean intra cluster distance and (b) is the mean nearest cluster distance from the given sample. We’ll use the mean silhouette score over all samples for evaluation of clustering methods.</a:t>
+                  <a:rPr lang="en-US" sz="3200" dirty="0"/>
+                  <a:t>, where (a) is the mean intra cluster distance and (b) is the mean nearest cluster distance from the given sample.</a:t>
                 </a:r>
               </a:p>
               <a:p>
@@ -4632,12 +4632,22 @@
                   <a:buChar char="•"/>
                 </a:pPr>
                 <a:r>
-                  <a:rPr lang="en-US" sz="3400" dirty="0"/>
+                  <a:rPr lang="en-US" sz="3200" dirty="0"/>
                   <a:t>Semi-supervised scoring: we’ll use the known labels to evaluate performance.</a:t>
                 </a:r>
               </a:p>
               <a:p>
-                <a:endParaRPr lang="en-US" sz="3400" dirty="0">
+                <a:pPr marL="571500" indent="-571500">
+                  <a:buFont typeface="Arial" panose="020B0604020202020204" pitchFamily="34" charset="0"/>
+                  <a:buChar char="•"/>
+                </a:pPr>
+                <a:r>
+                  <a:rPr lang="en-US" sz="3200" dirty="0"/>
+                  <a:t>Semi-clustering: Using clustering as a classifying method by clustering labeled data and checking prediction of new data to specific clusters.</a:t>
+                </a:r>
+              </a:p>
+              <a:p>
+                <a:endParaRPr lang="en-US" sz="3200" dirty="0">
                   <a:ln w="0"/>
                   <a:solidFill>
                     <a:schemeClr val="accent4">
@@ -4655,7 +4665,7 @@
               </a:p>
               <a:p>
                 <a:r>
-                  <a:rPr lang="en-US" sz="3400" dirty="0">
+                  <a:rPr lang="en-US" sz="3200" dirty="0">
                     <a:ln w="0"/>
                     <a:solidFill>
                       <a:schemeClr val="accent4">
@@ -4672,7 +4682,7 @@
                   </a:rPr>
                   <a:t>Data preparation and preprocessing</a:t>
                 </a:r>
-                <a:endParaRPr lang="en-US" sz="3400" dirty="0"/>
+                <a:endParaRPr lang="en-US" sz="3200" dirty="0"/>
               </a:p>
               <a:p>
                 <a:pPr marL="571500" indent="-571500">
@@ -4680,7 +4690,7 @@
                   <a:buChar char="•"/>
                 </a:pPr>
                 <a:r>
-                  <a:rPr lang="en-US" sz="3400" dirty="0"/>
+                  <a:rPr lang="en-US" sz="3200" dirty="0"/>
                   <a:t>Dividing the data into training and test sets.</a:t>
                 </a:r>
               </a:p>
@@ -4690,49 +4700,49 @@
                   <a:buChar char="•"/>
                 </a:pPr>
                 <a:r>
-                  <a:rPr lang="en-US" sz="3400" dirty="0"/>
+                  <a:rPr lang="en-US" sz="3200" dirty="0"/>
                   <a:t>Normalizing and removing genes with</a:t>
                 </a:r>
               </a:p>
               <a:p>
                 <a:r>
-                  <a:rPr lang="en-US" sz="3400" dirty="0"/>
+                  <a:rPr lang="en-US" sz="3200" dirty="0"/>
                   <a:t>      low-variance from the train set.</a:t>
                 </a:r>
               </a:p>
               <a:p>
                 <a:r>
-                  <a:rPr lang="en-US" sz="3400" dirty="0"/>
+                  <a:rPr lang="en-US" sz="3200" dirty="0"/>
                   <a:t>      We performed a tuning of the variance</a:t>
                 </a:r>
               </a:p>
               <a:p>
                 <a:r>
-                  <a:rPr lang="en-US" sz="3400" dirty="0"/>
+                  <a:rPr lang="en-US" sz="3200" dirty="0"/>
                   <a:t>      threshold that was used for filtering.</a:t>
                 </a:r>
               </a:p>
               <a:p>
                 <a:r>
-                  <a:rPr lang="en-US" sz="3400" dirty="0"/>
+                  <a:rPr lang="en-US" sz="3200" dirty="0"/>
                   <a:t>      For score evaluation we used a</a:t>
                 </a:r>
               </a:p>
               <a:p>
                 <a:r>
-                  <a:rPr lang="en-US" sz="3400" dirty="0"/>
+                  <a:rPr lang="en-US" sz="3200" dirty="0"/>
                   <a:t>      decision-tree classifier with default</a:t>
                 </a:r>
               </a:p>
               <a:p>
                 <a:r>
-                  <a:rPr lang="en-US" sz="3400" dirty="0"/>
+                  <a:rPr lang="en-US" sz="3200" dirty="0"/>
                   <a:t>      parameters.</a:t>
                 </a:r>
               </a:p>
               <a:p>
                 <a:r>
-                  <a:rPr lang="en-US" sz="3400" dirty="0"/>
+                  <a:rPr lang="en-US" sz="3200" dirty="0"/>
                   <a:t>      We chose a threshold of 0.00005.</a:t>
                 </a:r>
               </a:p>
@@ -4742,56 +4752,56 @@
                   <a:buChar char="•"/>
                 </a:pPr>
                 <a:r>
-                  <a:rPr lang="en-US" sz="3400" dirty="0"/>
+                  <a:rPr lang="en-US" sz="3200" dirty="0"/>
                   <a:t>Oversampling the train set, so that genes</a:t>
                 </a:r>
               </a:p>
               <a:p>
                 <a:r>
-                  <a:rPr lang="en-US" sz="3400" dirty="0"/>
+                  <a:rPr lang="en-US" sz="3200" dirty="0"/>
                   <a:t>      with label ‘TRUE’ take a bigger part of the</a:t>
                 </a:r>
               </a:p>
               <a:p>
                 <a:r>
-                  <a:rPr lang="en-US" sz="3400" dirty="0"/>
+                  <a:rPr lang="en-US" sz="3200" dirty="0"/>
                   <a:t>      dataset. We performed a tuning of the</a:t>
                 </a:r>
               </a:p>
               <a:p>
                 <a:r>
-                  <a:rPr lang="en-US" sz="3400" dirty="0"/>
+                  <a:rPr lang="en-US" sz="3200" dirty="0"/>
                   <a:t>      desired ratio between ‘FALSE’ and ‘TRUE’</a:t>
                 </a:r>
               </a:p>
               <a:p>
                 <a:r>
-                  <a:rPr lang="en-US" sz="3400" dirty="0"/>
+                  <a:rPr lang="en-US" sz="3200" dirty="0"/>
                   <a:t>      labels. Number of ‘FALSE’ genes is</a:t>
                 </a:r>
               </a:p>
               <a:p>
                 <a:r>
-                  <a:rPr lang="en-US" sz="3400" dirty="0"/>
+                  <a:rPr lang="en-US" sz="3200" dirty="0"/>
                   <a:t>      multiplied by coefficient to obtain new</a:t>
                 </a:r>
               </a:p>
               <a:p>
                 <a:r>
-                  <a:rPr lang="en-US" sz="3400" dirty="0"/>
+                  <a:rPr lang="en-US" sz="3200" dirty="0"/>
                   <a:t>      number of ‘TRUE’ genes.</a:t>
                 </a:r>
               </a:p>
               <a:p>
                 <a:r>
-                  <a:rPr lang="en-US" sz="3400" dirty="0"/>
+                  <a:rPr lang="en-US" sz="3200" dirty="0"/>
                   <a:t>      We chose coefficient 1, so that ratio between</a:t>
                 </a:r>
               </a:p>
               <a:p>
                 <a:r>
-                  <a:rPr lang="en-US" sz="3400" dirty="0"/>
-                  <a:t>      ‘FALSE’ and ‘TRUE’ is 1:1.</a:t>
+                  <a:rPr lang="en-US" sz="3200" dirty="0"/>
+                  <a:t>                  ‘FALSE’ and ‘TRUE’ is 1:1.</a:t>
                 </a:r>
               </a:p>
             </p:txBody>
@@ -4815,7 +4825,7 @@
             <p:spPr>
               <a:xfrm>
                 <a:off x="1080345" y="20882620"/>
-                <a:ext cx="15193688" cy="22351696"/>
+                <a:ext cx="15193688" cy="21534806"/>
               </a:xfrm>
               <a:prstGeom prst="rect">
                 <a:avLst/>
@@ -4823,7 +4833,7 @@
               <a:blipFill>
                 <a:blip r:embed="rId3"/>
                 <a:stretch>
-                  <a:fillRect l="-1243" t="-409"/>
+                  <a:fillRect l="-1163" t="-368" r="-722"/>
                 </a:stretch>
               </a:blipFill>
             </p:spPr>
@@ -4832,7 +4842,7 @@
               <a:lstStyle/>
               <a:p>
                 <a:r>
-                  <a:rPr lang="en-US">
+                  <a:rPr lang="en-IL">
                     <a:noFill/>
                   </a:rPr>
                   <a:t> </a:t>
@@ -4912,7 +4922,7 @@
         </p:nvSpPr>
         <p:spPr>
           <a:xfrm>
-            <a:off x="18650297" y="17210212"/>
+            <a:off x="18578289" y="17916991"/>
             <a:ext cx="11582400" cy="1015663"/>
           </a:xfrm>
           <a:prstGeom prst="rect">
@@ -5048,7 +5058,7 @@
         <p:spPr>
           <a:xfrm>
             <a:off x="17498169" y="5976964"/>
-            <a:ext cx="14761640" cy="7663636"/>
+            <a:ext cx="14041560" cy="11326178"/>
           </a:xfrm>
           <a:prstGeom prst="rect">
             <a:avLst/>
@@ -5083,21 +5093,31 @@
           <a:p>
             <a:r>
               <a:rPr lang="en-US" sz="3400" dirty="0"/>
+              <a:t>A decision tree uses tree-like model of decisions that only contains conditional control statements. </a:t>
+            </a:r>
+            <a:r>
+              <a:rPr lang="en-US" sz="3400" dirty="0">
+                <a:highlight>
+                  <a:srgbClr val="FFFF00"/>
+                </a:highlight>
+              </a:rPr>
               <a:t>We tuned </a:t>
             </a:r>
             <a:r>
-              <a:rPr lang="en-US" sz="3400" dirty="0" err="1"/>
+              <a:rPr lang="en-US" sz="3400" dirty="0" err="1">
+                <a:highlight>
+                  <a:srgbClr val="FFFF00"/>
+                </a:highlight>
+              </a:rPr>
               <a:t>max_depth</a:t>
             </a:r>
             <a:r>
-              <a:rPr lang="en-US" sz="3400" dirty="0"/>
-              <a:t> parameter of decision tree, using 5 folds on the training</a:t>
-            </a:r>
-          </a:p>
-          <a:p>
-            <a:r>
-              <a:rPr lang="en-US" sz="3400" dirty="0"/>
-              <a:t>set. We chose maximal depth of 70.</a:t>
+              <a:rPr lang="en-US" sz="3400" dirty="0">
+                <a:highlight>
+                  <a:srgbClr val="FFFF00"/>
+                </a:highlight>
+              </a:rPr>
+              <a:t> parameter of decision tree, using 5 folds on the training set. We chose maximal depth of 70.</a:t>
             </a:r>
           </a:p>
           <a:p>
@@ -5126,15 +5146,69 @@
           <a:p>
             <a:r>
               <a:rPr lang="en-US" sz="3400" dirty="0"/>
+              <a:t>A supervised learning model with associated learning algorithms that analyze data used for classification. </a:t>
+            </a:r>
+            <a:r>
+              <a:rPr lang="en-US" sz="3400" dirty="0">
+                <a:highlight>
+                  <a:srgbClr val="FFFF00"/>
+                </a:highlight>
+              </a:rPr>
               <a:t>Similarly, we tuned </a:t>
             </a:r>
             <a:r>
-              <a:rPr lang="en-US" sz="3400" dirty="0" err="1"/>
+              <a:rPr lang="en-US" sz="3400" dirty="0" err="1">
+                <a:highlight>
+                  <a:srgbClr val="FFFF00"/>
+                </a:highlight>
+              </a:rPr>
               <a:t>max_iter</a:t>
             </a:r>
             <a:r>
+              <a:rPr lang="en-US" sz="3400" dirty="0">
+                <a:highlight>
+                  <a:srgbClr val="FFFF00"/>
+                </a:highlight>
+              </a:rPr>
+              <a:t> parameter of SVM classifier. We chose to allow a maximal iterations number of 20.</a:t>
+            </a:r>
+            <a:br>
               <a:rPr lang="en-US" sz="3400" dirty="0"/>
-              <a:t> parameter of SVM classifier. We chose to allow a maximal iterations number of 20.</a:t>
+            </a:br>
+            <a:endParaRPr lang="en-US" sz="3400" dirty="0"/>
+          </a:p>
+          <a:p>
+            <a:r>
+              <a:rPr lang="en-US" sz="3400" dirty="0">
+                <a:ln w="0"/>
+                <a:solidFill>
+                  <a:schemeClr val="accent4">
+                    <a:lumMod val="75000"/>
+                  </a:schemeClr>
+                </a:solidFill>
+                <a:effectLst>
+                  <a:outerShdw blurRad="38100" dist="25400" dir="5400000" algn="ctr" rotWithShape="0">
+                    <a:srgbClr val="6E747A">
+                      <a:alpha val="43000"/>
+                    </a:srgbClr>
+                  </a:outerShdw>
+                </a:effectLst>
+              </a:rPr>
+              <a:t>KNN (K nearest neighbors)</a:t>
+            </a:r>
+          </a:p>
+          <a:p>
+            <a:r>
+              <a:rPr lang="en-US" sz="3400" dirty="0"/>
+              <a:t>Non-parametric method used for classification and regression. </a:t>
+            </a:r>
+            <a:r>
+              <a:rPr lang="en-US" sz="3400" dirty="0">
+                <a:highlight>
+                  <a:srgbClr val="FFFF00"/>
+                </a:highlight>
+              </a:rPr>
+              <a:t>We used 5 neighbors for KNN classifier.</a:t>
             </a:r>
           </a:p>
           <a:p>
@@ -5149,7 +5223,7 @@
           <a:p>
             <a:r>
               <a:rPr lang="en-US" sz="3400" dirty="0"/>
-              <a:t>to decision tree.</a:t>
+              <a:t>to decision tree and KNN in terms of accuracy but showed the poorest performance in terms of recall score.</a:t>
             </a:r>
             <a:endParaRPr lang="he-IL" sz="3400" dirty="0"/>
           </a:p>
@@ -5158,7 +5232,7 @@
           </a:p>
           <a:p>
             <a:r>
-              <a:rPr lang="en-US" sz="3200" i="1" u="sng"/>
+              <a:rPr lang="en-US" sz="3200" i="1" u="sng" dirty="0"/>
               <a:t>SVM metrics:</a:t>
             </a:r>
           </a:p>
@@ -5196,7 +5270,7 @@
         </p:nvSpPr>
         <p:spPr>
           <a:xfrm>
-            <a:off x="17227760" y="18046139"/>
+            <a:off x="17221014" y="19168871"/>
             <a:ext cx="14761640" cy="7632859"/>
           </a:xfrm>
           <a:prstGeom prst="rect">
@@ -5368,24 +5442,131 @@
         </p:blipFill>
         <p:spPr>
           <a:xfrm>
-            <a:off x="25483922" y="21276402"/>
-            <a:ext cx="5839783" cy="4509833"/>
+            <a:off x="25685202" y="23055269"/>
+            <a:ext cx="5040560" cy="3892625"/>
           </a:xfrm>
           <a:prstGeom prst="rect">
             <a:avLst/>
           </a:prstGeom>
         </p:spPr>
       </p:pic>
-      <p:pic>
-        <p:nvPicPr>
-          <p:cNvPr id="28" name="Picture 27">
+      <p:sp>
+        <p:nvSpPr>
+          <p:cNvPr id="29" name="TextBox 28">
             <a:extLst>
               <a:ext uri="{FF2B5EF4-FFF2-40B4-BE49-F238E27FC236}">
-                <a16:creationId xmlns:a16="http://schemas.microsoft.com/office/drawing/2014/main" id="{2C820D7C-8B39-4565-92C9-5FA249216CD8}"/>
+                <a16:creationId xmlns:a16="http://schemas.microsoft.com/office/drawing/2014/main" id="{5F519F2A-9775-42EA-AC28-73D54432FFE5}"/>
               </a:ext>
             </a:extLst>
           </p:cNvPr>
-          <p:cNvPicPr/>
+          <p:cNvSpPr txBox="1"/>
+          <p:nvPr/>
+        </p:nvSpPr>
+        <p:spPr>
+          <a:xfrm>
+            <a:off x="17356920" y="30819724"/>
+            <a:ext cx="14326825" cy="7940635"/>
+          </a:xfrm>
+          <a:prstGeom prst="rect">
+            <a:avLst/>
+          </a:prstGeom>
+          <a:noFill/>
+        </p:spPr>
+        <p:txBody>
+          <a:bodyPr wrap="square" rtlCol="0">
+            <a:spAutoFit/>
+          </a:bodyPr>
+          <a:lstStyle/>
+          <a:p>
+            <a:pPr marL="285750" indent="-285750">
+              <a:buFont typeface="Arial" panose="020B0604020202020204" pitchFamily="34" charset="0"/>
+              <a:buChar char="•"/>
+            </a:pPr>
+            <a:r>
+              <a:rPr lang="en-US" sz="3400" dirty="0"/>
+              <a:t>Both supervised and unsupervised methods did not show good performance.</a:t>
+            </a:r>
+          </a:p>
+          <a:p>
+            <a:pPr marL="285750" indent="-285750">
+              <a:buFont typeface="Arial" panose="020B0604020202020204" pitchFamily="34" charset="0"/>
+              <a:buChar char="•"/>
+            </a:pPr>
+            <a:r>
+              <a:rPr lang="en-US" sz="3400" dirty="0"/>
+              <a:t>For supervised methods, there was a relatively high accuracy due to the small fraction of ‘TRUE’ labels in the dataset. We managed to improve precision and recall metrics, but still most ‘TRUE’ genes are wrongly classified.</a:t>
+            </a:r>
+          </a:p>
+          <a:p>
+            <a:pPr marL="285750" indent="-285750">
+              <a:buFont typeface="Arial" panose="020B0604020202020204" pitchFamily="34" charset="0"/>
+              <a:buChar char="•"/>
+            </a:pPr>
+            <a:r>
+              <a:rPr lang="en-US" sz="3400" dirty="0"/>
+              <a:t>For unsupervised methods, we chose the number of clusters that maximize silhouette score. However, with labels taken into account, the clusters are heterogenous. </a:t>
+            </a:r>
+          </a:p>
+          <a:p>
+            <a:pPr marL="285750" indent="-285750">
+              <a:buFont typeface="Arial" panose="020B0604020202020204" pitchFamily="34" charset="0"/>
+              <a:buChar char="•"/>
+            </a:pPr>
+            <a:r>
+              <a:rPr lang="en-US" sz="3400" dirty="0"/>
+              <a:t>A possible explanation could be that down-regulation of </a:t>
+            </a:r>
+            <a:r>
+              <a:rPr lang="en-US" sz="3400" dirty="0" err="1"/>
+              <a:t>PKCδ</a:t>
+            </a:r>
+            <a:r>
+              <a:rPr lang="en-US" sz="3400" dirty="0"/>
+              <a:t> has an affect on other biological functions and therefore non-apoptosis genes also show changes in expression levels.</a:t>
+            </a:r>
+          </a:p>
+          <a:p>
+            <a:pPr marL="285750" indent="-285750">
+              <a:buFont typeface="Arial" panose="020B0604020202020204" pitchFamily="34" charset="0"/>
+              <a:buChar char="•"/>
+            </a:pPr>
+            <a:r>
+              <a:rPr lang="en-US" sz="3400" dirty="0"/>
+              <a:t>Another point to note is that maybe some of the apoptosis genes are not affected by down-regulation of </a:t>
+            </a:r>
+            <a:r>
+              <a:rPr lang="en-US" sz="3400" dirty="0" err="1"/>
+              <a:t>PKCδ</a:t>
+            </a:r>
+            <a:r>
+              <a:rPr lang="en-US" sz="3400" dirty="0"/>
+              <a:t> and therefore their expression levels did not change, despite being labeled as ‘TRUE’.</a:t>
+            </a:r>
+          </a:p>
+          <a:p>
+            <a:pPr marL="285750" indent="-285750">
+              <a:buFont typeface="Arial" panose="020B0604020202020204" pitchFamily="34" charset="0"/>
+              <a:buChar char="•"/>
+            </a:pPr>
+            <a:r>
+              <a:rPr lang="en-US" sz="3400" dirty="0"/>
+              <a:t>We assume that for better results, perhaps a different labeling approach should be applied (for example, multiclass rather than binary).</a:t>
+            </a:r>
+          </a:p>
+        </p:txBody>
+      </p:sp>
+      <p:pic>
+        <p:nvPicPr>
+          <p:cNvPr id="4" name="Picture 3">
+            <a:extLst>
+              <a:ext uri="{FF2B5EF4-FFF2-40B4-BE49-F238E27FC236}">
+                <a16:creationId xmlns:a16="http://schemas.microsoft.com/office/drawing/2014/main" id="{61F9B65C-7152-4664-BC87-0D5C83C879B8}"/>
+              </a:ext>
+            </a:extLst>
+          </p:cNvPr>
+          <p:cNvPicPr>
+            <a:picLocks noChangeAspect="1"/>
+          </p:cNvPicPr>
           <p:nvPr/>
         </p:nvPicPr>
         <p:blipFill>
@@ -5396,119 +5577,14 @@
         </p:blipFill>
         <p:spPr>
           <a:xfrm>
-            <a:off x="25483922" y="10790949"/>
-            <a:ext cx="5520308" cy="4196919"/>
+            <a:off x="25707081" y="13911616"/>
+            <a:ext cx="5049429" cy="3754069"/>
           </a:xfrm>
           <a:prstGeom prst="rect">
             <a:avLst/>
           </a:prstGeom>
         </p:spPr>
       </p:pic>
-      <p:sp>
-        <p:nvSpPr>
-          <p:cNvPr id="29" name="TextBox 28">
-            <a:extLst>
-              <a:ext uri="{FF2B5EF4-FFF2-40B4-BE49-F238E27FC236}">
-                <a16:creationId xmlns:a16="http://schemas.microsoft.com/office/drawing/2014/main" id="{5F519F2A-9775-42EA-AC28-73D54432FFE5}"/>
-              </a:ext>
-            </a:extLst>
-          </p:cNvPr>
-          <p:cNvSpPr txBox="1"/>
-          <p:nvPr/>
-        </p:nvSpPr>
-        <p:spPr>
-          <a:xfrm>
-            <a:off x="17356920" y="30819724"/>
-            <a:ext cx="14326825" cy="7940635"/>
-          </a:xfrm>
-          <a:prstGeom prst="rect">
-            <a:avLst/>
-          </a:prstGeom>
-          <a:noFill/>
-        </p:spPr>
-        <p:txBody>
-          <a:bodyPr wrap="square" rtlCol="0">
-            <a:spAutoFit/>
-          </a:bodyPr>
-          <a:lstStyle/>
-          <a:p>
-            <a:pPr marL="285750" indent="-285750">
-              <a:buFont typeface="Arial" panose="020B0604020202020204" pitchFamily="34" charset="0"/>
-              <a:buChar char="•"/>
-            </a:pPr>
-            <a:r>
-              <a:rPr lang="en-US" sz="3400" dirty="0"/>
-              <a:t>Both supervised and unsupervised methods did not show good performance.</a:t>
-            </a:r>
-          </a:p>
-          <a:p>
-            <a:pPr marL="285750" indent="-285750">
-              <a:buFont typeface="Arial" panose="020B0604020202020204" pitchFamily="34" charset="0"/>
-              <a:buChar char="•"/>
-            </a:pPr>
-            <a:r>
-              <a:rPr lang="en-US" sz="3400" dirty="0"/>
-              <a:t>For supervised methods, there was a relatively high accuracy due to the small fraction of ‘TRUE’ labels in the dataset. We managed to improve precision and recall metrics using, but still most ‘TRUE’ genes are wrongly classified.</a:t>
-            </a:r>
-          </a:p>
-          <a:p>
-            <a:pPr marL="285750" indent="-285750">
-              <a:buFont typeface="Arial" panose="020B0604020202020204" pitchFamily="34" charset="0"/>
-              <a:buChar char="•"/>
-            </a:pPr>
-            <a:r>
-              <a:rPr lang="en-US" sz="3400" dirty="0"/>
-              <a:t>For unsupervised methods, we chose the number of clusters  that maximize silhouette score. However, with labels taken into account, the clusters are heterogenous. </a:t>
-            </a:r>
-          </a:p>
-          <a:p>
-            <a:pPr marL="285750" indent="-285750">
-              <a:buFont typeface="Arial" panose="020B0604020202020204" pitchFamily="34" charset="0"/>
-              <a:buChar char="•"/>
-            </a:pPr>
-            <a:r>
-              <a:rPr lang="en-US" sz="3400" dirty="0"/>
-              <a:t>A possible explanation could be that down-regulation of </a:t>
-            </a:r>
-            <a:r>
-              <a:rPr lang="en-US" sz="3400" dirty="0" err="1"/>
-              <a:t>PKCδ</a:t>
-            </a:r>
-            <a:r>
-              <a:rPr lang="en-US" sz="3400" dirty="0"/>
-              <a:t> has an affect on other biological functions and therefore non-apoptosis genes also show changes in expression levels.</a:t>
-            </a:r>
-          </a:p>
-          <a:p>
-            <a:pPr marL="285750" indent="-285750">
-              <a:buFont typeface="Arial" panose="020B0604020202020204" pitchFamily="34" charset="0"/>
-              <a:buChar char="•"/>
-            </a:pPr>
-            <a:r>
-              <a:rPr lang="en-US" sz="3400" dirty="0"/>
-              <a:t>Another point to note is that maybe some of the apoptosis genes are not affected by down-regulation of </a:t>
-            </a:r>
-            <a:r>
-              <a:rPr lang="en-US" sz="3400" dirty="0" err="1"/>
-              <a:t>PKCδ</a:t>
-            </a:r>
-            <a:r>
-              <a:rPr lang="en-US" sz="3400" dirty="0"/>
-              <a:t> and therefore their expression levels did not change, despite being labeled as ‘TRUE’.</a:t>
-            </a:r>
-          </a:p>
-          <a:p>
-            <a:pPr marL="285750" indent="-285750">
-              <a:buFont typeface="Arial" panose="020B0604020202020204" pitchFamily="34" charset="0"/>
-              <a:buChar char="•"/>
-            </a:pPr>
-            <a:r>
-              <a:rPr lang="en-US" sz="3400" dirty="0"/>
-              <a:t>We assume that for better results, perhaps a different labeling approach should be applied (for example, multiclass rather than binary).</a:t>
-            </a:r>
-          </a:p>
-        </p:txBody>
-      </p:sp>
     </p:spTree>
   </p:cSld>
   <p:clrMapOvr>

</xml_diff>

<commit_message>
Small update to poster
</commit_message>
<xml_diff>
--- a/Project/project_poster.pptx
+++ b/Project/project_poster.pptx
@@ -4062,7 +4062,7 @@
           <p:cNvPr id="3" name="TextBox 2">
             <a:extLst>
               <a:ext uri="{FF2B5EF4-FFF2-40B4-BE49-F238E27FC236}">
-                <a16:creationId xmlns:a16="http://schemas.microsoft.com/office/drawing/2014/main" xmlns="" id="{42DB555F-2B7D-4674-A6CF-05BCE42F2F7C}"/>
+                <a16:creationId xmlns:a16="http://schemas.microsoft.com/office/drawing/2014/main" id="{42DB555F-2B7D-4674-A6CF-05BCE42F2F7C}"/>
               </a:ext>
             </a:extLst>
           </p:cNvPr>
@@ -4123,18 +4123,14 @@
             </a:pPr>
             <a:r>
               <a:rPr lang="en-US" sz="3400" dirty="0"/>
-              <a:t>Identification of targets for apoptosis induction is important to provide novel therapeutic approaches in breast cancer</a:t>
-            </a:r>
-            <a:r>
-              <a:rPr lang="en-US" sz="3400" dirty="0" smtClean="0"/>
-              <a:t>.</a:t>
-            </a:r>
-          </a:p>
-          <a:p>
-            <a:endParaRPr lang="en-US" sz="3400" dirty="0" smtClean="0"/>
-          </a:p>
-          <a:p>
-            <a:endParaRPr lang="en-US" sz="3200" dirty="0" smtClean="0"/>
+              <a:t>Identification of targets for apoptosis induction is important to provide novel therapeutic approaches in breast cancer.</a:t>
+            </a:r>
+          </a:p>
+          <a:p>
+            <a:endParaRPr lang="en-US" sz="3400" dirty="0"/>
+          </a:p>
+          <a:p>
+            <a:endParaRPr lang="en-US" sz="3200" dirty="0"/>
           </a:p>
           <a:p>
             <a:endParaRPr lang="en-US" sz="1600" dirty="0"/>
@@ -4156,7 +4152,6 @@
               <a:rPr lang="en-US" sz="3400" dirty="0"/>
               <a:t> can be used as treatment. </a:t>
             </a:r>
-            <a:endParaRPr lang="en-US" sz="3400" dirty="0" smtClean="0"/>
           </a:p>
           <a:p>
             <a:endParaRPr lang="en-US" sz="3400" dirty="0"/>
@@ -4175,7 +4170,7 @@
           <p:cNvPr id="31" name="TextBox 30">
             <a:extLst>
               <a:ext uri="{FF2B5EF4-FFF2-40B4-BE49-F238E27FC236}">
-                <a16:creationId xmlns:a16="http://schemas.microsoft.com/office/drawing/2014/main" xmlns="" id="{20EE0A04-D7A1-4886-A7D2-E94F75BD8CD9}"/>
+                <a16:creationId xmlns:a16="http://schemas.microsoft.com/office/drawing/2014/main" id="{20EE0A04-D7A1-4886-A7D2-E94F75BD8CD9}"/>
               </a:ext>
             </a:extLst>
           </p:cNvPr>
@@ -4214,24 +4209,19 @@
             </a:pPr>
             <a:r>
               <a:rPr lang="en-US" sz="3200" dirty="0"/>
-              <a:t>Be able to classify whether a gene is related to apoptosis based on its expression levels in different cells, with and without treatment. We expect genes associated with apoptosis show difference in expression levels between treatment and control samples</a:t>
-            </a:r>
-            <a:r>
-              <a:rPr lang="en-US" sz="3200" dirty="0" smtClean="0"/>
-              <a:t>.</a:t>
-            </a:r>
-            <a:endParaRPr lang="en-US" sz="3200" dirty="0"/>
-          </a:p>
-        </p:txBody>
-      </p:sp>
-      <mc:AlternateContent xmlns:mc="http://schemas.openxmlformats.org/markup-compatibility/2006">
-        <mc:Choice xmlns:a14="http://schemas.microsoft.com/office/drawing/2010/main" Requires="a14">
+              <a:t>Be able to classify whether a gene is related to apoptosis based on its expression levels in different cells, with and without treatment. We expect genes associated with apoptosis show difference in expression levels between treatment and control samples.</a:t>
+            </a:r>
+          </a:p>
+        </p:txBody>
+      </p:sp>
+      <mc:AlternateContent xmlns:mc="http://schemas.openxmlformats.org/markup-compatibility/2006" xmlns:a14="http://schemas.microsoft.com/office/drawing/2010/main">
+        <mc:Choice Requires="a14">
           <p:sp>
             <p:nvSpPr>
               <p:cNvPr id="37" name="TextBox 36">
                 <a:extLst>
                   <a:ext uri="{FF2B5EF4-FFF2-40B4-BE49-F238E27FC236}">
-                    <a16:creationId xmlns:a16="http://schemas.microsoft.com/office/drawing/2014/main" xmlns="" id="{F92EC576-90EE-4208-A83B-5BE276CEA082}"/>
+                    <a16:creationId xmlns:a16="http://schemas.microsoft.com/office/drawing/2014/main" id="{F92EC576-90EE-4208-A83B-5BE276CEA082}"/>
                   </a:ext>
                 </a:extLst>
               </p:cNvPr>
@@ -4320,25 +4310,7 @@
                       </a:outerShdw>
                     </a:effectLst>
                   </a:rPr>
-                  <a:t>Building the </a:t>
-                </a:r>
-                <a:r>
-                  <a:rPr lang="en-US" sz="3200" dirty="0" smtClean="0">
-                    <a:ln w="0"/>
-                    <a:solidFill>
-                      <a:schemeClr val="accent4">
-                        <a:lumMod val="75000"/>
-                      </a:schemeClr>
-                    </a:solidFill>
-                    <a:effectLst>
-                      <a:outerShdw blurRad="38100" dist="25400" dir="5400000" algn="ctr" rotWithShape="0">
-                        <a:srgbClr val="6E747A">
-                          <a:alpha val="43000"/>
-                        </a:srgbClr>
-                      </a:outerShdw>
-                    </a:effectLst>
-                  </a:rPr>
-                  <a:t>dataset</a:t>
+                  <a:t>Building the dataset</a:t>
                 </a:r>
               </a:p>
               <a:p>
@@ -4368,13 +4340,8 @@
               <a:p>
                 <a:r>
                   <a:rPr lang="en-US" sz="3200" dirty="0"/>
-                  <a:t>        - MDA-mB-468 (adenocarcinoma</a:t>
+                  <a:t>        - MDA-mB-468 (adenocarcinoma)</a:t>
                 </a:r>
-                <a:r>
-                  <a:rPr lang="en-US" sz="3200" dirty="0" smtClean="0"/>
-                  <a:t>)</a:t>
-                </a:r>
-                <a:endParaRPr lang="en-US" sz="3200" dirty="0"/>
               </a:p>
               <a:p>
                 <a:pPr marL="571500" indent="-571500">
@@ -4393,27 +4360,18 @@
                 </a:pPr>
                 <a:r>
                   <a:rPr lang="en-US" sz="3200" dirty="0"/>
-                  <a:t>Labeling the data using process GO term: label ‘TRUE’ for genes associated with apoptosis GO terms and label ‘FALSE’ otherwise</a:t>
-                </a:r>
-                <a:r>
-                  <a:rPr lang="en-US" sz="3200" dirty="0" smtClean="0"/>
-                  <a:t>.</a:t>
+                  <a:t>Labeling the data using process GO term: label ‘TRUE’ for genes associated with apoptosis GO terms and label ‘FALSE’ otherwise.</a:t>
                 </a:r>
               </a:p>
               <a:p>
                 <a:r>
-                  <a:rPr lang="en-US" sz="4000" b="1" dirty="0" smtClean="0">
+                  <a:rPr lang="en-US" sz="4000" b="1" dirty="0">
                     <a:solidFill>
                       <a:srgbClr val="FF0000"/>
                     </a:solidFill>
                   </a:rPr>
                   <a:t>TODO: diagram of labeling</a:t>
                 </a:r>
-                <a:endParaRPr lang="en-US" sz="4000" b="1" dirty="0">
-                  <a:solidFill>
-                    <a:srgbClr val="FF0000"/>
-                  </a:solidFill>
-                </a:endParaRPr>
               </a:p>
               <a:p>
                 <a:pPr marL="571500" indent="-571500">
@@ -4788,7 +4746,7 @@
             </p:txBody>
           </p:sp>
         </mc:Choice>
-        <mc:Fallback>
+        <mc:Fallback xmlns="">
           <p:sp>
             <p:nvSpPr>
               <p:cNvPr id="37" name="TextBox 36">
@@ -4838,7 +4796,7 @@
           <p:cNvPr id="30" name="Picture 29">
             <a:extLst>
               <a:ext uri="{FF2B5EF4-FFF2-40B4-BE49-F238E27FC236}">
-                <a16:creationId xmlns:a16="http://schemas.microsoft.com/office/drawing/2014/main" xmlns="" id="{B88F1C59-008E-486A-8BB6-1F1B00E9AB14}"/>
+                <a16:creationId xmlns:a16="http://schemas.microsoft.com/office/drawing/2014/main" id="{B88F1C59-008E-486A-8BB6-1F1B00E9AB14}"/>
               </a:ext>
             </a:extLst>
           </p:cNvPr>
@@ -4866,7 +4824,7 @@
           <p:cNvPr id="33" name="Picture 32">
             <a:extLst>
               <a:ext uri="{FF2B5EF4-FFF2-40B4-BE49-F238E27FC236}">
-                <a16:creationId xmlns:a16="http://schemas.microsoft.com/office/drawing/2014/main" xmlns="" id="{2A337755-2C70-443D-A284-4CD8FA67AE64}"/>
+                <a16:creationId xmlns:a16="http://schemas.microsoft.com/office/drawing/2014/main" id="{2A337755-2C70-443D-A284-4CD8FA67AE64}"/>
               </a:ext>
             </a:extLst>
           </p:cNvPr>
@@ -4894,7 +4852,7 @@
           <p:cNvPr id="38" name="TextBox 37">
             <a:extLst>
               <a:ext uri="{FF2B5EF4-FFF2-40B4-BE49-F238E27FC236}">
-                <a16:creationId xmlns:a16="http://schemas.microsoft.com/office/drawing/2014/main" xmlns="" id="{BCE3222F-B312-4A5A-B18E-5DCAE8B1C37C}"/>
+                <a16:creationId xmlns:a16="http://schemas.microsoft.com/office/drawing/2014/main" id="{BCE3222F-B312-4A5A-B18E-5DCAE8B1C37C}"/>
               </a:ext>
             </a:extLst>
           </p:cNvPr>
@@ -4930,7 +4888,7 @@
           <p:cNvPr id="40" name="TextBox 39">
             <a:extLst>
               <a:ext uri="{FF2B5EF4-FFF2-40B4-BE49-F238E27FC236}">
-                <a16:creationId xmlns:a16="http://schemas.microsoft.com/office/drawing/2014/main" xmlns="" id="{3B7647D7-CFE0-4CBB-BB60-E7A325E1173F}"/>
+                <a16:creationId xmlns:a16="http://schemas.microsoft.com/office/drawing/2014/main" id="{3B7647D7-CFE0-4CBB-BB60-E7A325E1173F}"/>
               </a:ext>
             </a:extLst>
           </p:cNvPr>
@@ -5029,7 +4987,7 @@
           <p:cNvPr id="41" name="TextBox 40">
             <a:extLst>
               <a:ext uri="{FF2B5EF4-FFF2-40B4-BE49-F238E27FC236}">
-                <a16:creationId xmlns:a16="http://schemas.microsoft.com/office/drawing/2014/main" xmlns="" id="{96BDCC20-3B36-41AA-8FC3-B68D496AECC1}"/>
+                <a16:creationId xmlns:a16="http://schemas.microsoft.com/office/drawing/2014/main" id="{96BDCC20-3B36-41AA-8FC3-B68D496AECC1}"/>
               </a:ext>
             </a:extLst>
           </p:cNvPr>
@@ -5153,10 +5111,6 @@
               </a:rPr>
               <a:t> parameter of SVM classifier. We chose to allow a maximal iterations number of 20.</a:t>
             </a:r>
-            <a:r>
-              <a:rPr lang="en-US" sz="3400" dirty="0"/>
-              <a:t/>
-            </a:r>
             <a:br>
               <a:rPr lang="en-US" sz="3400" dirty="0"/>
             </a:br>
@@ -5246,7 +5200,7 @@
           <p:cNvPr id="25" name="TextBox 24">
             <a:extLst>
               <a:ext uri="{FF2B5EF4-FFF2-40B4-BE49-F238E27FC236}">
-                <a16:creationId xmlns:a16="http://schemas.microsoft.com/office/drawing/2014/main" xmlns="" id="{DBB78202-4095-4C57-BC31-2098BA74ED69}"/>
+                <a16:creationId xmlns:a16="http://schemas.microsoft.com/office/drawing/2014/main" id="{DBB78202-4095-4C57-BC31-2098BA74ED69}"/>
               </a:ext>
             </a:extLst>
           </p:cNvPr>
@@ -5410,7 +5364,7 @@
           <p:cNvPr id="2" name="Picture 1">
             <a:extLst>
               <a:ext uri="{FF2B5EF4-FFF2-40B4-BE49-F238E27FC236}">
-                <a16:creationId xmlns:a16="http://schemas.microsoft.com/office/drawing/2014/main" xmlns="" id="{420C307D-0F08-4157-8A7F-D1E796CBB31F}"/>
+                <a16:creationId xmlns:a16="http://schemas.microsoft.com/office/drawing/2014/main" id="{420C307D-0F08-4157-8A7F-D1E796CBB31F}"/>
               </a:ext>
             </a:extLst>
           </p:cNvPr>
@@ -5440,7 +5394,7 @@
           <p:cNvPr id="29" name="TextBox 28">
             <a:extLst>
               <a:ext uri="{FF2B5EF4-FFF2-40B4-BE49-F238E27FC236}">
-                <a16:creationId xmlns:a16="http://schemas.microsoft.com/office/drawing/2014/main" xmlns="" id="{5F519F2A-9775-42EA-AC28-73D54432FFE5}"/>
+                <a16:creationId xmlns:a16="http://schemas.microsoft.com/office/drawing/2014/main" id="{5F519F2A-9775-42EA-AC28-73D54432FFE5}"/>
               </a:ext>
             </a:extLst>
           </p:cNvPr>
@@ -5545,7 +5499,7 @@
           <p:cNvPr id="4" name="Picture 3">
             <a:extLst>
               <a:ext uri="{FF2B5EF4-FFF2-40B4-BE49-F238E27FC236}">
-                <a16:creationId xmlns:a16="http://schemas.microsoft.com/office/drawing/2014/main" xmlns="" id="{61F9B65C-7152-4664-BC87-0D5C83C879B8}"/>
+                <a16:creationId xmlns:a16="http://schemas.microsoft.com/office/drawing/2014/main" id="{61F9B65C-7152-4664-BC87-0D5C83C879B8}"/>
               </a:ext>
             </a:extLst>
           </p:cNvPr>
@@ -5579,7 +5533,7 @@
         <p:spPr>
           <a:xfrm>
             <a:off x="1740894" y="9217324"/>
-            <a:ext cx="1923732" cy="1107996"/>
+            <a:ext cx="1450012" cy="830997"/>
           </a:xfrm>
           <a:prstGeom prst="rect">
             <a:avLst/>
@@ -5593,7 +5547,7 @@
           <a:lstStyle/>
           <a:p>
             <a:r>
-              <a:rPr lang="en-US" sz="6600" dirty="0" err="1" smtClean="0"/>
+              <a:rPr lang="en-US" sz="4800" dirty="0" err="1"/>
               <a:t>PKCδ</a:t>
             </a:r>
             <a:endParaRPr lang="en-US" sz="6600" dirty="0"/>
@@ -5608,7 +5562,7 @@
         </p:nvCxnSpPr>
         <p:spPr>
           <a:xfrm>
-            <a:off x="3656809" y="9793388"/>
+            <a:off x="3190906" y="9618211"/>
             <a:ext cx="2320080" cy="0"/>
           </a:xfrm>
           <a:prstGeom prst="line">
@@ -5635,36 +5589,6 @@
           </a:fontRef>
         </p:style>
       </p:cxnSp>
-      <p:sp>
-        <p:nvSpPr>
-          <p:cNvPr id="15" name="TextBox 14"/>
-          <p:cNvSpPr txBox="1"/>
-          <p:nvPr/>
-        </p:nvSpPr>
-        <p:spPr>
-          <a:xfrm>
-            <a:off x="2520505" y="16419422"/>
-            <a:ext cx="11153694" cy="1400383"/>
-          </a:xfrm>
-          <a:prstGeom prst="rect">
-            <a:avLst/>
-          </a:prstGeom>
-          <a:noFill/>
-        </p:spPr>
-        <p:txBody>
-          <a:bodyPr wrap="none" rtlCol="0">
-            <a:spAutoFit/>
-          </a:bodyPr>
-          <a:lstStyle/>
-          <a:p>
-            <a:r>
-              <a:rPr lang="en-US" dirty="0" smtClean="0"/>
-              <a:t>TODO: Classifier diagram</a:t>
-            </a:r>
-            <a:endParaRPr lang="en-US" dirty="0"/>
-          </a:p>
-        </p:txBody>
-      </p:sp>
       <p:pic>
         <p:nvPicPr>
           <p:cNvPr id="35" name="Picture 34"/>
@@ -5709,6 +5633,424 @@
           </a:prstGeom>
         </p:spPr>
       </p:pic>
+      <p:cxnSp>
+        <p:nvCxnSpPr>
+          <p:cNvPr id="34" name="Straight Connector 33">
+            <a:extLst>
+              <a:ext uri="{FF2B5EF4-FFF2-40B4-BE49-F238E27FC236}">
+                <a16:creationId xmlns:a16="http://schemas.microsoft.com/office/drawing/2014/main" id="{3A3D6D0F-0E73-4264-BE23-F8DF97C2B992}"/>
+              </a:ext>
+            </a:extLst>
+          </p:cNvPr>
+          <p:cNvCxnSpPr>
+            <a:cxnSpLocks/>
+          </p:cNvCxnSpPr>
+          <p:nvPr/>
+        </p:nvCxnSpPr>
+        <p:spPr>
+          <a:xfrm flipV="1">
+            <a:off x="5510986" y="9422925"/>
+            <a:ext cx="0" cy="368424"/>
+          </a:xfrm>
+          <a:prstGeom prst="line">
+            <a:avLst/>
+          </a:prstGeom>
+          <a:ln w="57150">
+            <a:solidFill>
+              <a:schemeClr val="tx1"/>
+            </a:solidFill>
+          </a:ln>
+        </p:spPr>
+        <p:style>
+          <a:lnRef idx="1">
+            <a:schemeClr val="dk1"/>
+          </a:lnRef>
+          <a:fillRef idx="0">
+            <a:schemeClr val="dk1"/>
+          </a:fillRef>
+          <a:effectRef idx="0">
+            <a:schemeClr val="dk1"/>
+          </a:effectRef>
+          <a:fontRef idx="minor">
+            <a:schemeClr val="tx1"/>
+          </a:fontRef>
+        </p:style>
+      </p:cxnSp>
+      <p:sp>
+        <p:nvSpPr>
+          <p:cNvPr id="39" name="TextBox 38">
+            <a:extLst>
+              <a:ext uri="{FF2B5EF4-FFF2-40B4-BE49-F238E27FC236}">
+                <a16:creationId xmlns:a16="http://schemas.microsoft.com/office/drawing/2014/main" id="{CA8A1FA6-6B2B-4CF3-818E-69FF8051D5B0}"/>
+              </a:ext>
+            </a:extLst>
+          </p:cNvPr>
+          <p:cNvSpPr txBox="1"/>
+          <p:nvPr/>
+        </p:nvSpPr>
+        <p:spPr>
+          <a:xfrm>
+            <a:off x="5728283" y="9217324"/>
+            <a:ext cx="4279313" cy="830997"/>
+          </a:xfrm>
+          <a:prstGeom prst="rect">
+            <a:avLst/>
+          </a:prstGeom>
+          <a:noFill/>
+        </p:spPr>
+        <p:txBody>
+          <a:bodyPr wrap="none" rtlCol="0">
+            <a:spAutoFit/>
+          </a:bodyPr>
+          <a:lstStyle/>
+          <a:p>
+            <a:r>
+              <a:rPr lang="en-US" sz="4800" dirty="0"/>
+              <a:t>ERK1/2 pathway</a:t>
+            </a:r>
+          </a:p>
+        </p:txBody>
+      </p:sp>
+      <p:cxnSp>
+        <p:nvCxnSpPr>
+          <p:cNvPr id="42" name="Straight Connector 41">
+            <a:extLst>
+              <a:ext uri="{FF2B5EF4-FFF2-40B4-BE49-F238E27FC236}">
+                <a16:creationId xmlns:a16="http://schemas.microsoft.com/office/drawing/2014/main" id="{8B293ED2-E014-429D-AA8F-B6FD9F69AB89}"/>
+              </a:ext>
+            </a:extLst>
+          </p:cNvPr>
+          <p:cNvCxnSpPr/>
+          <p:nvPr/>
+        </p:nvCxnSpPr>
+        <p:spPr>
+          <a:xfrm>
+            <a:off x="10007596" y="9607137"/>
+            <a:ext cx="2320080" cy="0"/>
+          </a:xfrm>
+          <a:prstGeom prst="line">
+            <a:avLst/>
+          </a:prstGeom>
+          <a:ln w="57150">
+            <a:solidFill>
+              <a:schemeClr val="tx1"/>
+            </a:solidFill>
+          </a:ln>
+        </p:spPr>
+        <p:style>
+          <a:lnRef idx="1">
+            <a:schemeClr val="dk1"/>
+          </a:lnRef>
+          <a:fillRef idx="0">
+            <a:schemeClr val="dk1"/>
+          </a:fillRef>
+          <a:effectRef idx="0">
+            <a:schemeClr val="dk1"/>
+          </a:effectRef>
+          <a:fontRef idx="minor">
+            <a:schemeClr val="tx1"/>
+          </a:fontRef>
+        </p:style>
+      </p:cxnSp>
+      <p:cxnSp>
+        <p:nvCxnSpPr>
+          <p:cNvPr id="43" name="Straight Connector 42">
+            <a:extLst>
+              <a:ext uri="{FF2B5EF4-FFF2-40B4-BE49-F238E27FC236}">
+                <a16:creationId xmlns:a16="http://schemas.microsoft.com/office/drawing/2014/main" id="{B1394F82-062A-48EF-A3AB-87D56D451C52}"/>
+              </a:ext>
+            </a:extLst>
+          </p:cNvPr>
+          <p:cNvCxnSpPr>
+            <a:cxnSpLocks/>
+          </p:cNvCxnSpPr>
+          <p:nvPr/>
+        </p:nvCxnSpPr>
+        <p:spPr>
+          <a:xfrm flipV="1">
+            <a:off x="12327676" y="9411851"/>
+            <a:ext cx="0" cy="368424"/>
+          </a:xfrm>
+          <a:prstGeom prst="line">
+            <a:avLst/>
+          </a:prstGeom>
+          <a:ln w="57150">
+            <a:solidFill>
+              <a:schemeClr val="tx1"/>
+            </a:solidFill>
+          </a:ln>
+        </p:spPr>
+        <p:style>
+          <a:lnRef idx="1">
+            <a:schemeClr val="dk1"/>
+          </a:lnRef>
+          <a:fillRef idx="0">
+            <a:schemeClr val="dk1"/>
+          </a:fillRef>
+          <a:effectRef idx="0">
+            <a:schemeClr val="dk1"/>
+          </a:effectRef>
+          <a:fontRef idx="minor">
+            <a:schemeClr val="tx1"/>
+          </a:fontRef>
+        </p:style>
+      </p:cxnSp>
+      <p:sp>
+        <p:nvSpPr>
+          <p:cNvPr id="44" name="TextBox 43">
+            <a:extLst>
+              <a:ext uri="{FF2B5EF4-FFF2-40B4-BE49-F238E27FC236}">
+                <a16:creationId xmlns:a16="http://schemas.microsoft.com/office/drawing/2014/main" id="{E8EC71EB-2657-4437-A168-9A60181E0F3A}"/>
+              </a:ext>
+            </a:extLst>
+          </p:cNvPr>
+          <p:cNvSpPr txBox="1"/>
+          <p:nvPr/>
+        </p:nvSpPr>
+        <p:spPr>
+          <a:xfrm>
+            <a:off x="12424254" y="9180564"/>
+            <a:ext cx="2658998" cy="830997"/>
+          </a:xfrm>
+          <a:prstGeom prst="rect">
+            <a:avLst/>
+          </a:prstGeom>
+          <a:noFill/>
+        </p:spPr>
+        <p:txBody>
+          <a:bodyPr wrap="none" rtlCol="0">
+            <a:spAutoFit/>
+          </a:bodyPr>
+          <a:lstStyle/>
+          <a:p>
+            <a:r>
+              <a:rPr lang="en-US" sz="4800" dirty="0"/>
+              <a:t>Apoptosis</a:t>
+            </a:r>
+          </a:p>
+        </p:txBody>
+      </p:sp>
+      <p:sp>
+        <p:nvSpPr>
+          <p:cNvPr id="45" name="TextBox 44">
+            <a:extLst>
+              <a:ext uri="{FF2B5EF4-FFF2-40B4-BE49-F238E27FC236}">
+                <a16:creationId xmlns:a16="http://schemas.microsoft.com/office/drawing/2014/main" id="{6D9A96BB-396E-4C53-8FF7-35443E3364D4}"/>
+              </a:ext>
+            </a:extLst>
+          </p:cNvPr>
+          <p:cNvSpPr txBox="1"/>
+          <p:nvPr/>
+        </p:nvSpPr>
+        <p:spPr>
+          <a:xfrm>
+            <a:off x="1029160" y="16518312"/>
+            <a:ext cx="4323491" cy="1569660"/>
+          </a:xfrm>
+          <a:prstGeom prst="rect">
+            <a:avLst/>
+          </a:prstGeom>
+          <a:noFill/>
+        </p:spPr>
+        <p:txBody>
+          <a:bodyPr wrap="none" rtlCol="0">
+            <a:spAutoFit/>
+          </a:bodyPr>
+          <a:lstStyle/>
+          <a:p>
+            <a:pPr algn="ctr"/>
+            <a:r>
+              <a:rPr lang="en-US" sz="4800" dirty="0"/>
+              <a:t>Gene Expression</a:t>
+            </a:r>
+          </a:p>
+          <a:p>
+            <a:pPr algn="ctr"/>
+            <a:r>
+              <a:rPr lang="en-US" sz="4800" dirty="0"/>
+              <a:t>Data</a:t>
+            </a:r>
+            <a:endParaRPr lang="en-US" sz="6600" dirty="0"/>
+          </a:p>
+        </p:txBody>
+      </p:sp>
+      <p:cxnSp>
+        <p:nvCxnSpPr>
+          <p:cNvPr id="14" name="Straight Arrow Connector 13">
+            <a:extLst>
+              <a:ext uri="{FF2B5EF4-FFF2-40B4-BE49-F238E27FC236}">
+                <a16:creationId xmlns:a16="http://schemas.microsoft.com/office/drawing/2014/main" id="{930ADC05-08E3-4439-9A05-89AA8383F606}"/>
+              </a:ext>
+            </a:extLst>
+          </p:cNvPr>
+          <p:cNvCxnSpPr>
+            <a:cxnSpLocks/>
+          </p:cNvCxnSpPr>
+          <p:nvPr/>
+        </p:nvCxnSpPr>
+        <p:spPr>
+          <a:xfrm>
+            <a:off x="5352651" y="17273181"/>
+            <a:ext cx="1704358" cy="0"/>
+          </a:xfrm>
+          <a:prstGeom prst="straightConnector1">
+            <a:avLst/>
+          </a:prstGeom>
+          <a:ln w="76200">
+            <a:tailEnd type="triangle"/>
+          </a:ln>
+        </p:spPr>
+        <p:style>
+          <a:lnRef idx="1">
+            <a:schemeClr val="dk1"/>
+          </a:lnRef>
+          <a:fillRef idx="0">
+            <a:schemeClr val="dk1"/>
+          </a:fillRef>
+          <a:effectRef idx="0">
+            <a:schemeClr val="dk1"/>
+          </a:effectRef>
+          <a:fontRef idx="minor">
+            <a:schemeClr val="tx1"/>
+          </a:fontRef>
+        </p:style>
+      </p:cxnSp>
+      <p:sp>
+        <p:nvSpPr>
+          <p:cNvPr id="49" name="TextBox 48">
+            <a:extLst>
+              <a:ext uri="{FF2B5EF4-FFF2-40B4-BE49-F238E27FC236}">
+                <a16:creationId xmlns:a16="http://schemas.microsoft.com/office/drawing/2014/main" id="{36533274-FBBA-45B8-AC82-507AEAF89379}"/>
+              </a:ext>
+            </a:extLst>
+          </p:cNvPr>
+          <p:cNvSpPr txBox="1"/>
+          <p:nvPr/>
+        </p:nvSpPr>
+        <p:spPr>
+          <a:xfrm>
+            <a:off x="7141530" y="16255899"/>
+            <a:ext cx="2613216" cy="2308324"/>
+          </a:xfrm>
+          <a:prstGeom prst="rect">
+            <a:avLst/>
+          </a:prstGeom>
+          <a:noFill/>
+        </p:spPr>
+        <p:txBody>
+          <a:bodyPr wrap="none" rtlCol="0">
+            <a:spAutoFit/>
+          </a:bodyPr>
+          <a:lstStyle/>
+          <a:p>
+            <a:pPr algn="ctr"/>
+            <a:r>
+              <a:rPr lang="en-US" sz="4800" dirty="0"/>
+              <a:t>Classifier</a:t>
+            </a:r>
+          </a:p>
+          <a:p>
+            <a:pPr algn="ctr"/>
+            <a:r>
+              <a:rPr lang="en-US" sz="4800" dirty="0"/>
+              <a:t>Based on </a:t>
+            </a:r>
+          </a:p>
+          <a:p>
+            <a:pPr algn="ctr"/>
+            <a:r>
+              <a:rPr lang="en-US" sz="4800" dirty="0"/>
+              <a:t>Go-Terms</a:t>
+            </a:r>
+            <a:endParaRPr lang="en-US" sz="6600" dirty="0"/>
+          </a:p>
+        </p:txBody>
+      </p:sp>
+      <p:cxnSp>
+        <p:nvCxnSpPr>
+          <p:cNvPr id="51" name="Straight Arrow Connector 50">
+            <a:extLst>
+              <a:ext uri="{FF2B5EF4-FFF2-40B4-BE49-F238E27FC236}">
+                <a16:creationId xmlns:a16="http://schemas.microsoft.com/office/drawing/2014/main" id="{76D7DD1D-BD44-4CCF-A7DE-46265F285AE1}"/>
+              </a:ext>
+            </a:extLst>
+          </p:cNvPr>
+          <p:cNvCxnSpPr>
+            <a:cxnSpLocks/>
+          </p:cNvCxnSpPr>
+          <p:nvPr/>
+        </p:nvCxnSpPr>
+        <p:spPr>
+          <a:xfrm>
+            <a:off x="9839267" y="17273181"/>
+            <a:ext cx="1704358" cy="0"/>
+          </a:xfrm>
+          <a:prstGeom prst="straightConnector1">
+            <a:avLst/>
+          </a:prstGeom>
+          <a:ln w="76200">
+            <a:tailEnd type="triangle"/>
+          </a:ln>
+        </p:spPr>
+        <p:style>
+          <a:lnRef idx="1">
+            <a:schemeClr val="dk1"/>
+          </a:lnRef>
+          <a:fillRef idx="0">
+            <a:schemeClr val="dk1"/>
+          </a:fillRef>
+          <a:effectRef idx="0">
+            <a:schemeClr val="dk1"/>
+          </a:effectRef>
+          <a:fontRef idx="minor">
+            <a:schemeClr val="tx1"/>
+          </a:fontRef>
+        </p:style>
+      </p:cxnSp>
+      <p:sp>
+        <p:nvSpPr>
+          <p:cNvPr id="52" name="TextBox 51">
+            <a:extLst>
+              <a:ext uri="{FF2B5EF4-FFF2-40B4-BE49-F238E27FC236}">
+                <a16:creationId xmlns:a16="http://schemas.microsoft.com/office/drawing/2014/main" id="{8F519855-F65A-4057-9162-960380ECB650}"/>
+              </a:ext>
+            </a:extLst>
+          </p:cNvPr>
+          <p:cNvSpPr txBox="1"/>
+          <p:nvPr/>
+        </p:nvSpPr>
+        <p:spPr>
+          <a:xfrm>
+            <a:off x="10920984" y="16839587"/>
+            <a:ext cx="3204532" cy="1569660"/>
+          </a:xfrm>
+          <a:prstGeom prst="rect">
+            <a:avLst/>
+          </a:prstGeom>
+          <a:noFill/>
+        </p:spPr>
+        <p:txBody>
+          <a:bodyPr wrap="none" rtlCol="0">
+            <a:spAutoFit/>
+          </a:bodyPr>
+          <a:lstStyle/>
+          <a:p>
+            <a:pPr algn="ctr"/>
+            <a:r>
+              <a:rPr lang="en-US" sz="4800" dirty="0"/>
+              <a:t>Labels</a:t>
+            </a:r>
+          </a:p>
+          <a:p>
+            <a:pPr algn="ctr"/>
+            <a:r>
+              <a:rPr lang="en-US" sz="4800" dirty="0"/>
+              <a:t>(True, False)</a:t>
+            </a:r>
+            <a:endParaRPr lang="en-US" sz="6600" dirty="0"/>
+          </a:p>
+        </p:txBody>
+      </p:sp>
     </p:spTree>
   </p:cSld>
   <p:clrMapOvr>

</xml_diff>

<commit_message>
minor changes (TODO: graph captions)
</commit_message>
<xml_diff>
--- a/Project/project_poster.pptx
+++ b/Project/project_poster.pptx
@@ -303,7 +303,7 @@
             <a:fld id="{C33D5922-1A10-453D-B34B-87D0376FB0F9}" type="datetimeFigureOut">
               <a:rPr lang="en-US" smtClean="0"/>
               <a:pPr/>
-              <a:t>18-Mar-19</a:t>
+              <a:t>19-Mar-19</a:t>
             </a:fld>
             <a:endParaRPr lang="en-US"/>
           </a:p>
@@ -468,7 +468,7 @@
             <a:fld id="{C33D5922-1A10-453D-B34B-87D0376FB0F9}" type="datetimeFigureOut">
               <a:rPr lang="en-US" smtClean="0"/>
               <a:pPr/>
-              <a:t>18-Mar-19</a:t>
+              <a:t>19-Mar-19</a:t>
             </a:fld>
             <a:endParaRPr lang="en-US"/>
           </a:p>
@@ -643,7 +643,7 @@
             <a:fld id="{C33D5922-1A10-453D-B34B-87D0376FB0F9}" type="datetimeFigureOut">
               <a:rPr lang="en-US" smtClean="0"/>
               <a:pPr/>
-              <a:t>18-Mar-19</a:t>
+              <a:t>19-Mar-19</a:t>
             </a:fld>
             <a:endParaRPr lang="en-US"/>
           </a:p>
@@ -808,7 +808,7 @@
             <a:fld id="{C33D5922-1A10-453D-B34B-87D0376FB0F9}" type="datetimeFigureOut">
               <a:rPr lang="en-US" smtClean="0"/>
               <a:pPr/>
-              <a:t>18-Mar-19</a:t>
+              <a:t>19-Mar-19</a:t>
             </a:fld>
             <a:endParaRPr lang="en-US"/>
           </a:p>
@@ -1050,7 +1050,7 @@
             <a:fld id="{C33D5922-1A10-453D-B34B-87D0376FB0F9}" type="datetimeFigureOut">
               <a:rPr lang="en-US" smtClean="0"/>
               <a:pPr/>
-              <a:t>18-Mar-19</a:t>
+              <a:t>19-Mar-19</a:t>
             </a:fld>
             <a:endParaRPr lang="en-US"/>
           </a:p>
@@ -1332,7 +1332,7 @@
             <a:fld id="{C33D5922-1A10-453D-B34B-87D0376FB0F9}" type="datetimeFigureOut">
               <a:rPr lang="en-US" smtClean="0"/>
               <a:pPr/>
-              <a:t>18-Mar-19</a:t>
+              <a:t>19-Mar-19</a:t>
             </a:fld>
             <a:endParaRPr lang="en-US"/>
           </a:p>
@@ -1753,7 +1753,7 @@
             <a:fld id="{C33D5922-1A10-453D-B34B-87D0376FB0F9}" type="datetimeFigureOut">
               <a:rPr lang="en-US" smtClean="0"/>
               <a:pPr/>
-              <a:t>18-Mar-19</a:t>
+              <a:t>19-Mar-19</a:t>
             </a:fld>
             <a:endParaRPr lang="en-US"/>
           </a:p>
@@ -1867,7 +1867,7 @@
             <a:fld id="{C33D5922-1A10-453D-B34B-87D0376FB0F9}" type="datetimeFigureOut">
               <a:rPr lang="en-US" smtClean="0"/>
               <a:pPr/>
-              <a:t>18-Mar-19</a:t>
+              <a:t>19-Mar-19</a:t>
             </a:fld>
             <a:endParaRPr lang="en-US"/>
           </a:p>
@@ -1959,7 +1959,7 @@
             <a:fld id="{C33D5922-1A10-453D-B34B-87D0376FB0F9}" type="datetimeFigureOut">
               <a:rPr lang="en-US" smtClean="0"/>
               <a:pPr/>
-              <a:t>18-Mar-19</a:t>
+              <a:t>19-Mar-19</a:t>
             </a:fld>
             <a:endParaRPr lang="en-US"/>
           </a:p>
@@ -2231,7 +2231,7 @@
             <a:fld id="{C33D5922-1A10-453D-B34B-87D0376FB0F9}" type="datetimeFigureOut">
               <a:rPr lang="en-US" smtClean="0"/>
               <a:pPr/>
-              <a:t>18-Mar-19</a:t>
+              <a:t>19-Mar-19</a:t>
             </a:fld>
             <a:endParaRPr lang="en-US"/>
           </a:p>
@@ -2480,7 +2480,7 @@
             <a:fld id="{C33D5922-1A10-453D-B34B-87D0376FB0F9}" type="datetimeFigureOut">
               <a:rPr lang="en-US" smtClean="0"/>
               <a:pPr/>
-              <a:t>18-Mar-19</a:t>
+              <a:t>19-Mar-19</a:t>
             </a:fld>
             <a:endParaRPr lang="en-US"/>
           </a:p>
@@ -2688,7 +2688,7 @@
             <a:fld id="{C33D5922-1A10-453D-B34B-87D0376FB0F9}" type="datetimeFigureOut">
               <a:rPr lang="en-US" smtClean="0"/>
               <a:pPr/>
-              <a:t>18-Mar-19</a:t>
+              <a:t>19-Mar-19</a:t>
             </a:fld>
             <a:endParaRPr lang="en-US"/>
           </a:p>
@@ -4318,7 +4318,7 @@
             </a:pPr>
             <a:r>
               <a:rPr lang="en-US" sz="3200" dirty="0"/>
-              <a:t>Dataset: gene expression levels, before and after down regulation of </a:t>
+              <a:t>Dataset: 12 samples, gene expression levels, before and after down regulation of </a:t>
             </a:r>
             <a:r>
               <a:rPr lang="en-US" sz="3200" dirty="0" err="1"/>
@@ -4326,19 +4326,13 @@
             </a:r>
             <a:r>
               <a:rPr lang="en-US" sz="3200" dirty="0"/>
-              <a:t>:</a:t>
+              <a:t>:    - BT-549 (Invasive ductal carcinoma)</a:t>
             </a:r>
           </a:p>
           <a:p>
             <a:r>
               <a:rPr lang="en-US" sz="3200" dirty="0"/>
-              <a:t>        - BT-549 (Invasive ductal carcinoma)</a:t>
-            </a:r>
-          </a:p>
-          <a:p>
-            <a:r>
-              <a:rPr lang="en-US" sz="3200" dirty="0"/>
-              <a:t>        - MDA-mB-468 (adenocarcinoma)</a:t>
+              <a:t>                      - MDA-mB-468 (adenocarcinoma)</a:t>
             </a:r>
           </a:p>
           <a:p>
@@ -4745,7 +4739,7 @@
           <a:p>
             <a:r>
               <a:rPr lang="en-US" sz="3400" dirty="0"/>
-              <a:t>We used 5 neighbors for KNN classifier.</a:t>
+              <a:t>We used 3 neighbors for KNN classifier.</a:t>
             </a:r>
           </a:p>
         </p:txBody>
@@ -4765,7 +4759,7 @@
         <p:spPr>
           <a:xfrm>
             <a:off x="17378633" y="24582772"/>
-            <a:ext cx="14761640" cy="2708434"/>
+            <a:ext cx="14761640" cy="5016758"/>
           </a:xfrm>
           <a:prstGeom prst="rect">
             <a:avLst/>
@@ -4847,6 +4841,46 @@
               <a:rPr lang="en-US" sz="3400" dirty="0"/>
               <a:t> with 2 clusters.</a:t>
             </a:r>
+          </a:p>
+          <a:p>
+            <a:endParaRPr lang="en-US" sz="2000" dirty="0"/>
+          </a:p>
+          <a:p>
+            <a:r>
+              <a:rPr lang="en-US" sz="3200" dirty="0"/>
+              <a:t>1</a:t>
+            </a:r>
+            <a:r>
+              <a:rPr lang="en-US" sz="3200" baseline="30000" dirty="0"/>
+              <a:t>st</a:t>
+            </a:r>
+            <a:r>
+              <a:rPr lang="en-US" sz="3200" dirty="0"/>
+              <a:t> cluster true labels:  10 %</a:t>
+            </a:r>
+          </a:p>
+          <a:p>
+            <a:r>
+              <a:rPr lang="en-US" sz="3200" dirty="0"/>
+              <a:t>2</a:t>
+            </a:r>
+            <a:r>
+              <a:rPr lang="en-US" sz="3200" baseline="30000" dirty="0"/>
+              <a:t>nd</a:t>
+            </a:r>
+            <a:r>
+              <a:rPr lang="en-US" sz="3200" dirty="0"/>
+              <a:t> cluster true labels: 17 %</a:t>
+            </a:r>
+          </a:p>
+          <a:p>
+            <a:r>
+              <a:rPr lang="en-US" sz="2800" dirty="0"/>
+              <a:t>         - No cluster with majority true</a:t>
+            </a:r>
+          </a:p>
+          <a:p>
+            <a:endParaRPr lang="en-US" sz="3400" dirty="0"/>
           </a:p>
         </p:txBody>
       </p:sp>
@@ -5254,7 +5288,7 @@
         </p:nvCxnSpPr>
         <p:spPr>
           <a:xfrm>
-            <a:off x="4111382" y="30255914"/>
+            <a:off x="4184942" y="30255914"/>
             <a:ext cx="1287891" cy="0"/>
           </a:xfrm>
           <a:prstGeom prst="straightConnector1">
@@ -5450,8 +5484,8 @@
         </p:blipFill>
         <p:spPr>
           <a:xfrm>
-            <a:off x="24759453" y="17526584"/>
-            <a:ext cx="5553075" cy="4343400"/>
+            <a:off x="24123089" y="17888721"/>
+            <a:ext cx="7305923" cy="5320864"/>
           </a:xfrm>
           <a:prstGeom prst="rect">
             <a:avLst/>
@@ -5479,7 +5513,7 @@
         <p:spPr>
           <a:xfrm>
             <a:off x="24759453" y="12911828"/>
-            <a:ext cx="5695950" cy="4391314"/>
+            <a:ext cx="6276220" cy="4740676"/>
           </a:xfrm>
           <a:prstGeom prst="rect">
             <a:avLst/>
@@ -5544,7 +5578,7 @@
           <a:p>
             <a:r>
               <a:rPr lang="en-US" sz="3400" dirty="0"/>
-              <a:t>All classifiers show similar result in terms of accuracy which are significantly better than our baseline classifier. In terms of precision and recall score we see no improvement compared to the baseline classifier.</a:t>
+              <a:t>All classifiers show similar result in terms of accuracy which are significantly better than our baseline classifier. In terms of precision and recall score we see no improvement compared to the baseline classifier. </a:t>
             </a:r>
           </a:p>
         </p:txBody>
@@ -5569,8 +5603,8 @@
         </p:blipFill>
         <p:spPr>
           <a:xfrm>
-            <a:off x="25523406" y="7191093"/>
-            <a:ext cx="5943600" cy="4608830"/>
+            <a:off x="25347041" y="6391455"/>
+            <a:ext cx="6119964" cy="4842093"/>
           </a:xfrm>
           <a:prstGeom prst="rect">
             <a:avLst/>
@@ -5914,20 +5948,6 @@
               <a:t>Classifier</a:t>
             </a:r>
           </a:p>
-          <a:p>
-            <a:pPr algn="ctr"/>
-            <a:r>
-              <a:rPr lang="en-US" sz="4800" dirty="0"/>
-              <a:t>Based on </a:t>
-            </a:r>
-          </a:p>
-          <a:p>
-            <a:pPr algn="ctr"/>
-            <a:r>
-              <a:rPr lang="en-US" sz="4800" dirty="0"/>
-              <a:t>Go-Terms</a:t>
-            </a:r>
-          </a:p>
         </p:txBody>
       </p:sp>
       <p:sp>
@@ -6034,7 +6054,7 @@
             <a:pPr algn="ctr"/>
             <a:r>
               <a:rPr lang="en-US" sz="4800" dirty="0"/>
-              <a:t>Probes</a:t>
+              <a:t>probes</a:t>
             </a:r>
           </a:p>
           <a:p>
@@ -6207,7 +6227,7 @@
         </p:nvSpPr>
         <p:spPr>
           <a:xfrm>
-            <a:off x="775646" y="29739604"/>
+            <a:off x="847654" y="29739604"/>
             <a:ext cx="3257027" cy="969321"/>
           </a:xfrm>
           <a:prstGeom prst="roundRect">
@@ -6254,7 +6274,7 @@
         </p:nvSpPr>
         <p:spPr>
           <a:xfrm>
-            <a:off x="5663619" y="29733956"/>
+            <a:off x="5544841" y="29733956"/>
             <a:ext cx="5315558" cy="969321"/>
           </a:xfrm>
           <a:prstGeom prst="roundRect">

</xml_diff>